<commit_message>
Maj pptx du design ORM
</commit_message>
<xml_diff>
--- a/Module10_ORM/PreparationCours_DemoEF/Design/Design.pptx
+++ b/Module10_ORM/PreparationCours_DemoEF/Design/Design.pptx
@@ -3545,12 +3545,8 @@
           <a:p>
             <a:pPr algn="ctr"/>
             <a:r>
-              <a:rPr lang="fr-FR" sz="2400" err="1"/>
-              <a:t>DemoEF</a:t>
-            </a:r>
-            <a:r>
-              <a:rPr lang="fr-FR" sz="2400"/>
-              <a:t>_Console</a:t>
+              <a:rPr lang="fr-FR" sz="2400" dirty="0" err="1"/>
+              <a:t>DemoEF_Console</a:t>
             </a:r>
             <a:endParaRPr lang="fr-FR" sz="2400" dirty="0"/>
           </a:p>

</xml_diff>